<commit_message>
rust cloudfront worker hmac api - initial commit
</commit_message>
<xml_diff>
--- a/edge-slides/EdgeComputing.pptx
+++ b/edge-slides/EdgeComputing.pptx
@@ -33,23 +33,26 @@
     <p:sldId id="278" r:id="rId28"/>
     <p:sldId id="279" r:id="rId29"/>
     <p:sldId id="280" r:id="rId30"/>
+    <p:sldId id="281" r:id="rId31"/>
+    <p:sldId id="282" r:id="rId32"/>
+    <p:sldId id="283" r:id="rId33"/>
   </p:sldIdLst>
   <p:sldSz cy="5143500" cx="9144000"/>
   <p:notesSz cx="6858000" cy="9144000"/>
   <p:embeddedFontLst>
     <p:embeddedFont>
       <p:font typeface="Ubuntu"/>
-      <p:regular r:id="rId31"/>
-      <p:bold r:id="rId32"/>
-      <p:italic r:id="rId33"/>
-      <p:boldItalic r:id="rId34"/>
+      <p:regular r:id="rId34"/>
+      <p:bold r:id="rId35"/>
+      <p:italic r:id="rId36"/>
+      <p:boldItalic r:id="rId37"/>
     </p:embeddedFont>
     <p:embeddedFont>
       <p:font typeface="Ubuntu Light"/>
-      <p:regular r:id="rId35"/>
-      <p:bold r:id="rId36"/>
-      <p:italic r:id="rId37"/>
-      <p:boldItalic r:id="rId38"/>
+      <p:regular r:id="rId38"/>
+      <p:bold r:id="rId39"/>
+      <p:italic r:id="rId40"/>
+      <p:boldItalic r:id="rId41"/>
     </p:embeddedFont>
   </p:embeddedFontLst>
   <p:defaultTextStyle>
@@ -2230,7 +2233,7 @@
       </p:grpSpPr>
       <p:sp>
         <p:nvSpPr>
-          <p:cNvPr id="181" name="Google Shape;181;gba353554e8_0_14:notes"/>
+          <p:cNvPr id="181" name="Google Shape;181;gbc9ae455bf_0_0:notes"/>
           <p:cNvSpPr/>
           <p:nvPr>
             <p:ph idx="2" type="sldImg"/>
@@ -2265,7 +2268,7 @@
       </p:sp>
       <p:sp>
         <p:nvSpPr>
-          <p:cNvPr id="182" name="Google Shape;182;gba353554e8_0_14:notes"/>
+          <p:cNvPr id="182" name="Google Shape;182;gbc9ae455bf_0_0:notes"/>
           <p:cNvSpPr txBox="1"/>
           <p:nvPr>
             <p:ph idx="1" type="body"/>
@@ -2329,7 +2332,7 @@
       </p:grpSpPr>
       <p:sp>
         <p:nvSpPr>
-          <p:cNvPr id="186" name="Google Shape;186;gba353554e8_0_19:notes"/>
+          <p:cNvPr id="186" name="Google Shape;186;gbc9ae455bf_0_39:notes"/>
           <p:cNvSpPr/>
           <p:nvPr>
             <p:ph idx="2" type="sldImg"/>
@@ -2364,7 +2367,7 @@
       </p:sp>
       <p:sp>
         <p:nvSpPr>
-          <p:cNvPr id="187" name="Google Shape;187;gba353554e8_0_19:notes"/>
+          <p:cNvPr id="187" name="Google Shape;187;gbc9ae455bf_0_39:notes"/>
           <p:cNvSpPr txBox="1"/>
           <p:nvPr>
             <p:ph idx="1" type="body"/>
@@ -2414,7 +2417,7 @@
   <p:cSld>
     <p:spTree>
       <p:nvGrpSpPr>
-        <p:cNvPr id="190" name="Shape 190"/>
+        <p:cNvPr id="191" name="Shape 191"/>
         <p:cNvGrpSpPr/>
         <p:nvPr/>
       </p:nvGrpSpPr>
@@ -2428,7 +2431,7 @@
       </p:grpSpPr>
       <p:sp>
         <p:nvSpPr>
-          <p:cNvPr id="191" name="Google Shape;191;gba353554e8_0_24:notes"/>
+          <p:cNvPr id="192" name="Google Shape;192;gbc9ae455bf_0_29:notes"/>
           <p:cNvSpPr/>
           <p:nvPr>
             <p:ph idx="2" type="sldImg"/>
@@ -2463,7 +2466,304 @@
       </p:sp>
       <p:sp>
         <p:nvSpPr>
-          <p:cNvPr id="192" name="Google Shape;192;gba353554e8_0_24:notes"/>
+          <p:cNvPr id="193" name="Google Shape;193;gbc9ae455bf_0_29:notes"/>
+          <p:cNvSpPr txBox="1"/>
+          <p:nvPr>
+            <p:ph idx="1" type="body"/>
+          </p:nvPr>
+        </p:nvSpPr>
+        <p:spPr>
+          <a:xfrm>
+            <a:off x="685800" y="4343400"/>
+            <a:ext cx="5486400" cy="4114800"/>
+          </a:xfrm>
+          <a:prstGeom prst="rect">
+            <a:avLst/>
+          </a:prstGeom>
+        </p:spPr>
+        <p:txBody>
+          <a:bodyPr anchorCtr="0" anchor="t" bIns="91425" lIns="91425" spcFirstLastPara="1" rIns="91425" wrap="square" tIns="91425">
+            <a:noAutofit/>
+          </a:bodyPr>
+          <a:lstStyle/>
+          <a:p>
+            <a:pPr indent="0" lvl="0" marL="0" rtl="0" algn="l">
+              <a:spcBef>
+                <a:spcPts val="0"/>
+              </a:spcBef>
+              <a:spcAft>
+                <a:spcPts val="0"/>
+              </a:spcAft>
+              <a:buNone/>
+            </a:pPr>
+            <a:r>
+              <a:t/>
+            </a:r>
+            <a:endParaRPr/>
+          </a:p>
+        </p:txBody>
+      </p:sp>
+    </p:spTree>
+  </p:cSld>
+  <p:clrMapOvr>
+    <a:masterClrMapping/>
+  </p:clrMapOvr>
+</p:notes>
+</file>
+
+<file path=ppt/notesSlides/notesSlide26.xml><?xml version="1.0" encoding="utf-8"?>
+<p:notes xmlns:a="http://schemas.openxmlformats.org/drawingml/2006/main" xmlns:r="http://schemas.openxmlformats.org/officeDocument/2006/relationships" xmlns:mc="http://schemas.openxmlformats.org/markup-compatibility/2006" xmlns:mv="urn:schemas-microsoft-com:mac:vml" xmlns:p="http://schemas.openxmlformats.org/presentationml/2006/main" xmlns:c="http://schemas.openxmlformats.org/drawingml/2006/chart" xmlns:dgm="http://schemas.openxmlformats.org/drawingml/2006/diagram" xmlns:o="urn:schemas-microsoft-com:office:office" xmlns:v="urn:schemas-microsoft-com:vml" xmlns:pvml="urn:schemas-microsoft-com:office:powerpoint" xmlns:com="http://schemas.openxmlformats.org/drawingml/2006/compatibility" xmlns:p14="http://schemas.microsoft.com/office/powerpoint/2010/main" xmlns:p15="http://schemas.microsoft.com/office/powerpoint/2012/main" xmlns:ahyp="http://schemas.microsoft.com/office/drawing/2018/hyperlinkcolor" showMasterPhAnim="0" showMasterSp="0">
+  <p:cSld>
+    <p:spTree>
+      <p:nvGrpSpPr>
+        <p:cNvPr id="196" name="Shape 196"/>
+        <p:cNvGrpSpPr/>
+        <p:nvPr/>
+      </p:nvGrpSpPr>
+      <p:grpSpPr>
+        <a:xfrm>
+          <a:off x="0" y="0"/>
+          <a:ext cx="0" cy="0"/>
+          <a:chOff x="0" y="0"/>
+          <a:chExt cx="0" cy="0"/>
+        </a:xfrm>
+      </p:grpSpPr>
+      <p:sp>
+        <p:nvSpPr>
+          <p:cNvPr id="197" name="Google Shape;197;gbc9ae455bf_0_34:notes"/>
+          <p:cNvSpPr/>
+          <p:nvPr>
+            <p:ph idx="2" type="sldImg"/>
+          </p:nvPr>
+        </p:nvSpPr>
+        <p:spPr>
+          <a:xfrm>
+            <a:off x="381300" y="685800"/>
+            <a:ext cx="6096000" cy="3429000"/>
+          </a:xfrm>
+          <a:custGeom>
+            <a:rect b="b" l="l" r="r" t="t"/>
+            <a:pathLst>
+              <a:path extrusionOk="0" h="120000" w="120000">
+                <a:moveTo>
+                  <a:pt x="0" y="0"/>
+                </a:moveTo>
+                <a:lnTo>
+                  <a:pt x="120000" y="0"/>
+                </a:lnTo>
+                <a:lnTo>
+                  <a:pt x="120000" y="120000"/>
+                </a:lnTo>
+                <a:lnTo>
+                  <a:pt x="0" y="120000"/>
+                </a:lnTo>
+                <a:close/>
+              </a:path>
+            </a:pathLst>
+          </a:custGeom>
+        </p:spPr>
+      </p:sp>
+      <p:sp>
+        <p:nvSpPr>
+          <p:cNvPr id="198" name="Google Shape;198;gbc9ae455bf_0_34:notes"/>
+          <p:cNvSpPr txBox="1"/>
+          <p:nvPr>
+            <p:ph idx="1" type="body"/>
+          </p:nvPr>
+        </p:nvSpPr>
+        <p:spPr>
+          <a:xfrm>
+            <a:off x="685800" y="4343400"/>
+            <a:ext cx="5486400" cy="4114800"/>
+          </a:xfrm>
+          <a:prstGeom prst="rect">
+            <a:avLst/>
+          </a:prstGeom>
+        </p:spPr>
+        <p:txBody>
+          <a:bodyPr anchorCtr="0" anchor="t" bIns="91425" lIns="91425" spcFirstLastPara="1" rIns="91425" wrap="square" tIns="91425">
+            <a:noAutofit/>
+          </a:bodyPr>
+          <a:lstStyle/>
+          <a:p>
+            <a:pPr indent="0" lvl="0" marL="0" rtl="0" algn="l">
+              <a:spcBef>
+                <a:spcPts val="0"/>
+              </a:spcBef>
+              <a:spcAft>
+                <a:spcPts val="0"/>
+              </a:spcAft>
+              <a:buNone/>
+            </a:pPr>
+            <a:r>
+              <a:t/>
+            </a:r>
+            <a:endParaRPr/>
+          </a:p>
+        </p:txBody>
+      </p:sp>
+    </p:spTree>
+  </p:cSld>
+  <p:clrMapOvr>
+    <a:masterClrMapping/>
+  </p:clrMapOvr>
+</p:notes>
+</file>
+
+<file path=ppt/notesSlides/notesSlide27.xml><?xml version="1.0" encoding="utf-8"?>
+<p:notes xmlns:a="http://schemas.openxmlformats.org/drawingml/2006/main" xmlns:r="http://schemas.openxmlformats.org/officeDocument/2006/relationships" xmlns:mc="http://schemas.openxmlformats.org/markup-compatibility/2006" xmlns:mv="urn:schemas-microsoft-com:mac:vml" xmlns:p="http://schemas.openxmlformats.org/presentationml/2006/main" xmlns:c="http://schemas.openxmlformats.org/drawingml/2006/chart" xmlns:dgm="http://schemas.openxmlformats.org/drawingml/2006/diagram" xmlns:o="urn:schemas-microsoft-com:office:office" xmlns:v="urn:schemas-microsoft-com:vml" xmlns:pvml="urn:schemas-microsoft-com:office:powerpoint" xmlns:com="http://schemas.openxmlformats.org/drawingml/2006/compatibility" xmlns:p14="http://schemas.microsoft.com/office/powerpoint/2010/main" xmlns:p15="http://schemas.microsoft.com/office/powerpoint/2012/main" xmlns:ahyp="http://schemas.microsoft.com/office/drawing/2018/hyperlinkcolor" showMasterPhAnim="0" showMasterSp="0">
+  <p:cSld>
+    <p:spTree>
+      <p:nvGrpSpPr>
+        <p:cNvPr id="201" name="Shape 201"/>
+        <p:cNvGrpSpPr/>
+        <p:nvPr/>
+      </p:nvGrpSpPr>
+      <p:grpSpPr>
+        <a:xfrm>
+          <a:off x="0" y="0"/>
+          <a:ext cx="0" cy="0"/>
+          <a:chOff x="0" y="0"/>
+          <a:chExt cx="0" cy="0"/>
+        </a:xfrm>
+      </p:grpSpPr>
+      <p:sp>
+        <p:nvSpPr>
+          <p:cNvPr id="202" name="Google Shape;202;gba353554e8_0_19:notes"/>
+          <p:cNvSpPr/>
+          <p:nvPr>
+            <p:ph idx="2" type="sldImg"/>
+          </p:nvPr>
+        </p:nvSpPr>
+        <p:spPr>
+          <a:xfrm>
+            <a:off x="381300" y="685800"/>
+            <a:ext cx="6096000" cy="3429000"/>
+          </a:xfrm>
+          <a:custGeom>
+            <a:rect b="b" l="l" r="r" t="t"/>
+            <a:pathLst>
+              <a:path extrusionOk="0" h="120000" w="120000">
+                <a:moveTo>
+                  <a:pt x="0" y="0"/>
+                </a:moveTo>
+                <a:lnTo>
+                  <a:pt x="120000" y="0"/>
+                </a:lnTo>
+                <a:lnTo>
+                  <a:pt x="120000" y="120000"/>
+                </a:lnTo>
+                <a:lnTo>
+                  <a:pt x="0" y="120000"/>
+                </a:lnTo>
+                <a:close/>
+              </a:path>
+            </a:pathLst>
+          </a:custGeom>
+        </p:spPr>
+      </p:sp>
+      <p:sp>
+        <p:nvSpPr>
+          <p:cNvPr id="203" name="Google Shape;203;gba353554e8_0_19:notes"/>
+          <p:cNvSpPr txBox="1"/>
+          <p:nvPr>
+            <p:ph idx="1" type="body"/>
+          </p:nvPr>
+        </p:nvSpPr>
+        <p:spPr>
+          <a:xfrm>
+            <a:off x="685800" y="4343400"/>
+            <a:ext cx="5486400" cy="4114800"/>
+          </a:xfrm>
+          <a:prstGeom prst="rect">
+            <a:avLst/>
+          </a:prstGeom>
+        </p:spPr>
+        <p:txBody>
+          <a:bodyPr anchorCtr="0" anchor="t" bIns="91425" lIns="91425" spcFirstLastPara="1" rIns="91425" wrap="square" tIns="91425">
+            <a:noAutofit/>
+          </a:bodyPr>
+          <a:lstStyle/>
+          <a:p>
+            <a:pPr indent="0" lvl="0" marL="0" rtl="0" algn="l">
+              <a:spcBef>
+                <a:spcPts val="0"/>
+              </a:spcBef>
+              <a:spcAft>
+                <a:spcPts val="0"/>
+              </a:spcAft>
+              <a:buNone/>
+            </a:pPr>
+            <a:r>
+              <a:t/>
+            </a:r>
+            <a:endParaRPr/>
+          </a:p>
+        </p:txBody>
+      </p:sp>
+    </p:spTree>
+  </p:cSld>
+  <p:clrMapOvr>
+    <a:masterClrMapping/>
+  </p:clrMapOvr>
+</p:notes>
+</file>
+
+<file path=ppt/notesSlides/notesSlide28.xml><?xml version="1.0" encoding="utf-8"?>
+<p:notes xmlns:a="http://schemas.openxmlformats.org/drawingml/2006/main" xmlns:r="http://schemas.openxmlformats.org/officeDocument/2006/relationships" xmlns:mc="http://schemas.openxmlformats.org/markup-compatibility/2006" xmlns:mv="urn:schemas-microsoft-com:mac:vml" xmlns:p="http://schemas.openxmlformats.org/presentationml/2006/main" xmlns:c="http://schemas.openxmlformats.org/drawingml/2006/chart" xmlns:dgm="http://schemas.openxmlformats.org/drawingml/2006/diagram" xmlns:o="urn:schemas-microsoft-com:office:office" xmlns:v="urn:schemas-microsoft-com:vml" xmlns:pvml="urn:schemas-microsoft-com:office:powerpoint" xmlns:com="http://schemas.openxmlformats.org/drawingml/2006/compatibility" xmlns:p14="http://schemas.microsoft.com/office/powerpoint/2010/main" xmlns:p15="http://schemas.microsoft.com/office/powerpoint/2012/main" xmlns:ahyp="http://schemas.microsoft.com/office/drawing/2018/hyperlinkcolor" showMasterPhAnim="0" showMasterSp="0">
+  <p:cSld>
+    <p:spTree>
+      <p:nvGrpSpPr>
+        <p:cNvPr id="206" name="Shape 206"/>
+        <p:cNvGrpSpPr/>
+        <p:nvPr/>
+      </p:nvGrpSpPr>
+      <p:grpSpPr>
+        <a:xfrm>
+          <a:off x="0" y="0"/>
+          <a:ext cx="0" cy="0"/>
+          <a:chOff x="0" y="0"/>
+          <a:chExt cx="0" cy="0"/>
+        </a:xfrm>
+      </p:grpSpPr>
+      <p:sp>
+        <p:nvSpPr>
+          <p:cNvPr id="207" name="Google Shape;207;gba353554e8_0_24:notes"/>
+          <p:cNvSpPr/>
+          <p:nvPr>
+            <p:ph idx="2" type="sldImg"/>
+          </p:nvPr>
+        </p:nvSpPr>
+        <p:spPr>
+          <a:xfrm>
+            <a:off x="381300" y="685800"/>
+            <a:ext cx="6096000" cy="3429000"/>
+          </a:xfrm>
+          <a:custGeom>
+            <a:rect b="b" l="l" r="r" t="t"/>
+            <a:pathLst>
+              <a:path extrusionOk="0" h="120000" w="120000">
+                <a:moveTo>
+                  <a:pt x="0" y="0"/>
+                </a:moveTo>
+                <a:lnTo>
+                  <a:pt x="120000" y="0"/>
+                </a:lnTo>
+                <a:lnTo>
+                  <a:pt x="120000" y="120000"/>
+                </a:lnTo>
+                <a:lnTo>
+                  <a:pt x="0" y="120000"/>
+                </a:lnTo>
+                <a:close/>
+              </a:path>
+            </a:pathLst>
+          </a:custGeom>
+        </p:spPr>
+      </p:sp>
+      <p:sp>
+        <p:nvSpPr>
+          <p:cNvPr id="208" name="Google Shape;208;gba353554e8_0_24:notes"/>
           <p:cNvSpPr txBox="1"/>
           <p:nvPr>
             <p:ph idx="1" type="body"/>
@@ -10456,7 +10756,7 @@
         </p:nvSpPr>
         <p:spPr>
           <a:xfrm>
-            <a:off x="3312775" y="1621050"/>
+            <a:off x="3209250" y="1621050"/>
             <a:ext cx="2725500" cy="1901400"/>
           </a:xfrm>
           <a:prstGeom prst="rect">
@@ -10483,7 +10783,7 @@
               <a:buNone/>
             </a:pPr>
             <a:r>
-              <a:rPr b="1" lang="pt-BR" sz="1500">
+              <a:rPr b="1" lang="pt-BR" sz="2000">
                 <a:solidFill>
                   <a:srgbClr val="EFEFEF"/>
                 </a:solidFill>
@@ -10495,7 +10795,7 @@
               <a:t> </a:t>
             </a:r>
             <a:r>
-              <a:rPr lang="pt-BR" sz="13400">
+              <a:rPr lang="pt-BR" sz="2000">
                 <a:solidFill>
                   <a:srgbClr val="EFEFEF"/>
                 </a:solidFill>
@@ -10504,9 +10804,33 @@
                 <a:cs typeface="Ubuntu"/>
                 <a:sym typeface="Ubuntu"/>
               </a:rPr>
-              <a:t>?</a:t>
-            </a:r>
-            <a:endParaRPr sz="13400">
+              <a:t>hello, </a:t>
+            </a:r>
+            <a:r>
+              <a:rPr lang="pt-BR" sz="2000">
+                <a:solidFill>
+                  <a:schemeClr val="accent5"/>
+                </a:solidFill>
+                <a:latin typeface="Ubuntu"/>
+                <a:ea typeface="Ubuntu"/>
+                <a:cs typeface="Ubuntu"/>
+                <a:sym typeface="Ubuntu"/>
+              </a:rPr>
+              <a:t>world</a:t>
+            </a:r>
+            <a:r>
+              <a:rPr lang="pt-BR" sz="2000">
+                <a:solidFill>
+                  <a:srgbClr val="EFEFEF"/>
+                </a:solidFill>
+                <a:latin typeface="Ubuntu"/>
+                <a:ea typeface="Ubuntu"/>
+                <a:cs typeface="Ubuntu"/>
+                <a:sym typeface="Ubuntu"/>
+              </a:rPr>
+              <a:t>!</a:t>
+            </a:r>
+            <a:endParaRPr sz="2000">
               <a:solidFill>
                 <a:srgbClr val="EFEFEF"/>
               </a:solidFill>
@@ -10560,6 +10884,302 @@
         </p:nvSpPr>
         <p:spPr>
           <a:xfrm>
+            <a:off x="3312775" y="1621050"/>
+            <a:ext cx="2725500" cy="1901400"/>
+          </a:xfrm>
+          <a:prstGeom prst="rect">
+            <a:avLst/>
+          </a:prstGeom>
+          <a:ln>
+            <a:noFill/>
+          </a:ln>
+        </p:spPr>
+        <p:txBody>
+          <a:bodyPr anchorCtr="0" anchor="ctr" bIns="91425" lIns="91425" spcFirstLastPara="1" rIns="91425" wrap="square" tIns="91425">
+            <a:noAutofit/>
+          </a:bodyPr>
+          <a:lstStyle/>
+          <a:p>
+            <a:pPr indent="0" lvl="0" marL="0" rtl="0" algn="ctr">
+              <a:spcBef>
+                <a:spcPts val="0"/>
+              </a:spcBef>
+              <a:spcAft>
+                <a:spcPts val="0"/>
+              </a:spcAft>
+              <a:buSzPts val="990"/>
+              <a:buNone/>
+            </a:pPr>
+            <a:r>
+              <a:rPr b="1" lang="pt-BR" sz="1500">
+                <a:solidFill>
+                  <a:srgbClr val="EFEFEF"/>
+                </a:solidFill>
+                <a:latin typeface="Ubuntu"/>
+                <a:ea typeface="Ubuntu"/>
+                <a:cs typeface="Ubuntu"/>
+                <a:sym typeface="Ubuntu"/>
+              </a:rPr>
+              <a:t> </a:t>
+            </a:r>
+            <a:r>
+              <a:rPr lang="pt-BR" sz="13400">
+                <a:solidFill>
+                  <a:srgbClr val="EFEFEF"/>
+                </a:solidFill>
+                <a:latin typeface="Ubuntu"/>
+                <a:ea typeface="Ubuntu"/>
+                <a:cs typeface="Ubuntu"/>
+                <a:sym typeface="Ubuntu"/>
+              </a:rPr>
+              <a:t>?</a:t>
+            </a:r>
+            <a:endParaRPr sz="13400">
+              <a:solidFill>
+                <a:srgbClr val="EFEFEF"/>
+              </a:solidFill>
+              <a:latin typeface="Ubuntu"/>
+              <a:ea typeface="Ubuntu"/>
+              <a:cs typeface="Ubuntu"/>
+              <a:sym typeface="Ubuntu"/>
+            </a:endParaRPr>
+          </a:p>
+        </p:txBody>
+      </p:sp>
+      <p:pic>
+        <p:nvPicPr>
+          <p:cNvPr id="190" name="Google Shape;190;p36"/>
+          <p:cNvPicPr preferRelativeResize="0"/>
+          <p:nvPr/>
+        </p:nvPicPr>
+        <p:blipFill>
+          <a:blip r:embed="rId3">
+            <a:alphaModFix/>
+          </a:blip>
+          <a:stretch>
+            <a:fillRect/>
+          </a:stretch>
+        </p:blipFill>
+        <p:spPr>
+          <a:xfrm>
+            <a:off x="530913" y="128775"/>
+            <a:ext cx="8082175" cy="4950901"/>
+          </a:xfrm>
+          <a:prstGeom prst="rect">
+            <a:avLst/>
+          </a:prstGeom>
+          <a:noFill/>
+          <a:ln>
+            <a:noFill/>
+          </a:ln>
+        </p:spPr>
+      </p:pic>
+    </p:spTree>
+  </p:cSld>
+  <p:clrMapOvr>
+    <a:masterClrMapping/>
+  </p:clrMapOvr>
+</p:sld>
+</file>
+
+<file path=ppt/slides/slide25.xml><?xml version="1.0" encoding="utf-8"?>
+<p:sld xmlns:a="http://schemas.openxmlformats.org/drawingml/2006/main" xmlns:r="http://schemas.openxmlformats.org/officeDocument/2006/relationships" xmlns:mc="http://schemas.openxmlformats.org/markup-compatibility/2006" xmlns:mv="urn:schemas-microsoft-com:mac:vml" xmlns:p="http://schemas.openxmlformats.org/presentationml/2006/main" xmlns:c="http://schemas.openxmlformats.org/drawingml/2006/chart" xmlns:dgm="http://schemas.openxmlformats.org/drawingml/2006/diagram" xmlns:o="urn:schemas-microsoft-com:office:office" xmlns:v="urn:schemas-microsoft-com:vml" xmlns:pvml="urn:schemas-microsoft-com:office:powerpoint" xmlns:com="http://schemas.openxmlformats.org/drawingml/2006/compatibility" xmlns:p14="http://schemas.microsoft.com/office/powerpoint/2010/main" xmlns:p15="http://schemas.microsoft.com/office/powerpoint/2012/main" xmlns:ahyp="http://schemas.microsoft.com/office/drawing/2018/hyperlinkcolor">
+  <p:cSld>
+    <p:bg>
+      <p:bgPr>
+        <a:solidFill>
+          <a:srgbClr val="333333"/>
+        </a:solidFill>
+      </p:bgPr>
+    </p:bg>
+    <p:spTree>
+      <p:nvGrpSpPr>
+        <p:cNvPr id="194" name="Shape 194"/>
+        <p:cNvGrpSpPr/>
+        <p:nvPr/>
+      </p:nvGrpSpPr>
+      <p:grpSpPr>
+        <a:xfrm>
+          <a:off x="0" y="0"/>
+          <a:ext cx="0" cy="0"/>
+          <a:chOff x="0" y="0"/>
+          <a:chExt cx="0" cy="0"/>
+        </a:xfrm>
+      </p:grpSpPr>
+      <p:pic>
+        <p:nvPicPr>
+          <p:cNvPr id="195" name="Google Shape;195;p37"/>
+          <p:cNvPicPr preferRelativeResize="0"/>
+          <p:nvPr/>
+        </p:nvPicPr>
+        <p:blipFill>
+          <a:blip r:embed="rId3">
+            <a:alphaModFix/>
+          </a:blip>
+          <a:stretch>
+            <a:fillRect/>
+          </a:stretch>
+        </p:blipFill>
+        <p:spPr>
+          <a:xfrm>
+            <a:off x="557638" y="577487"/>
+            <a:ext cx="8028725" cy="3988525"/>
+          </a:xfrm>
+          <a:prstGeom prst="rect">
+            <a:avLst/>
+          </a:prstGeom>
+          <a:noFill/>
+          <a:ln>
+            <a:noFill/>
+          </a:ln>
+        </p:spPr>
+      </p:pic>
+    </p:spTree>
+  </p:cSld>
+  <p:clrMapOvr>
+    <a:masterClrMapping/>
+  </p:clrMapOvr>
+</p:sld>
+</file>
+
+<file path=ppt/slides/slide26.xml><?xml version="1.0" encoding="utf-8"?>
+<p:sld xmlns:a="http://schemas.openxmlformats.org/drawingml/2006/main" xmlns:r="http://schemas.openxmlformats.org/officeDocument/2006/relationships" xmlns:mc="http://schemas.openxmlformats.org/markup-compatibility/2006" xmlns:mv="urn:schemas-microsoft-com:mac:vml" xmlns:p="http://schemas.openxmlformats.org/presentationml/2006/main" xmlns:c="http://schemas.openxmlformats.org/drawingml/2006/chart" xmlns:dgm="http://schemas.openxmlformats.org/drawingml/2006/diagram" xmlns:o="urn:schemas-microsoft-com:office:office" xmlns:v="urn:schemas-microsoft-com:vml" xmlns:pvml="urn:schemas-microsoft-com:office:powerpoint" xmlns:com="http://schemas.openxmlformats.org/drawingml/2006/compatibility" xmlns:p14="http://schemas.microsoft.com/office/powerpoint/2010/main" xmlns:p15="http://schemas.microsoft.com/office/powerpoint/2012/main" xmlns:ahyp="http://schemas.microsoft.com/office/drawing/2018/hyperlinkcolor">
+  <p:cSld>
+    <p:bg>
+      <p:bgPr>
+        <a:solidFill>
+          <a:srgbClr val="333333"/>
+        </a:solidFill>
+      </p:bgPr>
+    </p:bg>
+    <p:spTree>
+      <p:nvGrpSpPr>
+        <p:cNvPr id="199" name="Shape 199"/>
+        <p:cNvGrpSpPr/>
+        <p:nvPr/>
+      </p:nvGrpSpPr>
+      <p:grpSpPr>
+        <a:xfrm>
+          <a:off x="0" y="0"/>
+          <a:ext cx="0" cy="0"/>
+          <a:chOff x="0" y="0"/>
+          <a:chExt cx="0" cy="0"/>
+        </a:xfrm>
+      </p:grpSpPr>
+      <p:sp>
+        <p:nvSpPr>
+          <p:cNvPr id="200" name="Google Shape;200;p38"/>
+          <p:cNvSpPr txBox="1"/>
+          <p:nvPr>
+            <p:ph type="ctrTitle"/>
+          </p:nvPr>
+        </p:nvSpPr>
+        <p:spPr>
+          <a:xfrm>
+            <a:off x="3312775" y="1621050"/>
+            <a:ext cx="2725500" cy="1901400"/>
+          </a:xfrm>
+          <a:prstGeom prst="rect">
+            <a:avLst/>
+          </a:prstGeom>
+          <a:ln>
+            <a:noFill/>
+          </a:ln>
+        </p:spPr>
+        <p:txBody>
+          <a:bodyPr anchorCtr="0" anchor="ctr" bIns="91425" lIns="91425" spcFirstLastPara="1" rIns="91425" wrap="square" tIns="91425">
+            <a:noAutofit/>
+          </a:bodyPr>
+          <a:lstStyle/>
+          <a:p>
+            <a:pPr indent="0" lvl="0" marL="0" rtl="0" algn="ctr">
+              <a:spcBef>
+                <a:spcPts val="0"/>
+              </a:spcBef>
+              <a:spcAft>
+                <a:spcPts val="0"/>
+              </a:spcAft>
+              <a:buSzPts val="990"/>
+              <a:buNone/>
+            </a:pPr>
+            <a:r>
+              <a:rPr b="1" lang="pt-BR" sz="1500">
+                <a:solidFill>
+                  <a:srgbClr val="EFEFEF"/>
+                </a:solidFill>
+                <a:latin typeface="Ubuntu"/>
+                <a:ea typeface="Ubuntu"/>
+                <a:cs typeface="Ubuntu"/>
+                <a:sym typeface="Ubuntu"/>
+              </a:rPr>
+              <a:t> </a:t>
+            </a:r>
+            <a:r>
+              <a:rPr lang="pt-BR" sz="13400">
+                <a:solidFill>
+                  <a:srgbClr val="EFEFEF"/>
+                </a:solidFill>
+                <a:latin typeface="Ubuntu"/>
+                <a:ea typeface="Ubuntu"/>
+                <a:cs typeface="Ubuntu"/>
+                <a:sym typeface="Ubuntu"/>
+              </a:rPr>
+              <a:t>?</a:t>
+            </a:r>
+            <a:endParaRPr sz="13400">
+              <a:solidFill>
+                <a:srgbClr val="EFEFEF"/>
+              </a:solidFill>
+              <a:latin typeface="Ubuntu"/>
+              <a:ea typeface="Ubuntu"/>
+              <a:cs typeface="Ubuntu"/>
+              <a:sym typeface="Ubuntu"/>
+            </a:endParaRPr>
+          </a:p>
+        </p:txBody>
+      </p:sp>
+    </p:spTree>
+  </p:cSld>
+  <p:clrMapOvr>
+    <a:masterClrMapping/>
+  </p:clrMapOvr>
+</p:sld>
+</file>
+
+<file path=ppt/slides/slide27.xml><?xml version="1.0" encoding="utf-8"?>
+<p:sld xmlns:a="http://schemas.openxmlformats.org/drawingml/2006/main" xmlns:r="http://schemas.openxmlformats.org/officeDocument/2006/relationships" xmlns:mc="http://schemas.openxmlformats.org/markup-compatibility/2006" xmlns:mv="urn:schemas-microsoft-com:mac:vml" xmlns:p="http://schemas.openxmlformats.org/presentationml/2006/main" xmlns:c="http://schemas.openxmlformats.org/drawingml/2006/chart" xmlns:dgm="http://schemas.openxmlformats.org/drawingml/2006/diagram" xmlns:o="urn:schemas-microsoft-com:office:office" xmlns:v="urn:schemas-microsoft-com:vml" xmlns:pvml="urn:schemas-microsoft-com:office:powerpoint" xmlns:com="http://schemas.openxmlformats.org/drawingml/2006/compatibility" xmlns:p14="http://schemas.microsoft.com/office/powerpoint/2010/main" xmlns:p15="http://schemas.microsoft.com/office/powerpoint/2012/main" xmlns:ahyp="http://schemas.microsoft.com/office/drawing/2018/hyperlinkcolor">
+  <p:cSld>
+    <p:bg>
+      <p:bgPr>
+        <a:solidFill>
+          <a:srgbClr val="333333"/>
+        </a:solidFill>
+      </p:bgPr>
+    </p:bg>
+    <p:spTree>
+      <p:nvGrpSpPr>
+        <p:cNvPr id="204" name="Shape 204"/>
+        <p:cNvGrpSpPr/>
+        <p:nvPr/>
+      </p:nvGrpSpPr>
+      <p:grpSpPr>
+        <a:xfrm>
+          <a:off x="0" y="0"/>
+          <a:ext cx="0" cy="0"/>
+          <a:chOff x="0" y="0"/>
+          <a:chExt cx="0" cy="0"/>
+        </a:xfrm>
+      </p:grpSpPr>
+      <p:sp>
+        <p:nvSpPr>
+          <p:cNvPr id="205" name="Google Shape;205;p39"/>
+          <p:cNvSpPr txBox="1"/>
+          <p:nvPr>
+            <p:ph type="ctrTitle"/>
+          </p:nvPr>
+        </p:nvSpPr>
+        <p:spPr>
+          <a:xfrm>
             <a:off x="4572000" y="3716350"/>
             <a:ext cx="4244100" cy="948000"/>
           </a:xfrm>
@@ -10630,7 +11250,7 @@
 </p:sld>
 </file>
 
-<file path=ppt/slides/slide25.xml><?xml version="1.0" encoding="utf-8"?>
+<file path=ppt/slides/slide28.xml><?xml version="1.0" encoding="utf-8"?>
 <p:sld xmlns:a="http://schemas.openxmlformats.org/drawingml/2006/main" xmlns:r="http://schemas.openxmlformats.org/officeDocument/2006/relationships" xmlns:mc="http://schemas.openxmlformats.org/markup-compatibility/2006" xmlns:mv="urn:schemas-microsoft-com:mac:vml" xmlns:p="http://schemas.openxmlformats.org/presentationml/2006/main" xmlns:c="http://schemas.openxmlformats.org/drawingml/2006/chart" xmlns:dgm="http://schemas.openxmlformats.org/drawingml/2006/diagram" xmlns:o="urn:schemas-microsoft-com:office:office" xmlns:v="urn:schemas-microsoft-com:vml" xmlns:pvml="urn:schemas-microsoft-com:office:powerpoint" xmlns:com="http://schemas.openxmlformats.org/drawingml/2006/compatibility" xmlns:p14="http://schemas.microsoft.com/office/powerpoint/2010/main" xmlns:p15="http://schemas.microsoft.com/office/powerpoint/2012/main" xmlns:ahyp="http://schemas.microsoft.com/office/drawing/2018/hyperlinkcolor">
   <p:cSld>
     <p:bg>
@@ -10642,7 +11262,7 @@
     </p:bg>
     <p:spTree>
       <p:nvGrpSpPr>
-        <p:cNvPr id="193" name="Shape 193"/>
+        <p:cNvPr id="209" name="Shape 209"/>
         <p:cNvGrpSpPr/>
         <p:nvPr/>
       </p:nvGrpSpPr>
@@ -10656,7 +11276,7 @@
       </p:grpSpPr>
       <p:sp>
         <p:nvSpPr>
-          <p:cNvPr id="194" name="Google Shape;194;p37"/>
+          <p:cNvPr id="210" name="Google Shape;210;p40"/>
           <p:cNvSpPr txBox="1"/>
           <p:nvPr>
             <p:ph type="ctrTitle"/>
@@ -10679,6 +11299,30 @@
             <a:noAutofit/>
           </a:bodyPr>
           <a:lstStyle/>
+          <a:p>
+            <a:pPr indent="0" lvl="0" marL="0" rtl="0" algn="l">
+              <a:spcBef>
+                <a:spcPts val="0"/>
+              </a:spcBef>
+              <a:spcAft>
+                <a:spcPts val="0"/>
+              </a:spcAft>
+              <a:buSzPts val="990"/>
+              <a:buNone/>
+            </a:pPr>
+            <a:r>
+              <a:t/>
+            </a:r>
+            <a:endParaRPr sz="1400">
+              <a:solidFill>
+                <a:srgbClr val="EFEFEF"/>
+              </a:solidFill>
+              <a:latin typeface="Ubuntu"/>
+              <a:ea typeface="Ubuntu"/>
+              <a:cs typeface="Ubuntu"/>
+              <a:sym typeface="Ubuntu"/>
+            </a:endParaRPr>
+          </a:p>
           <a:p>
             <a:pPr indent="0" lvl="0" marL="0" rtl="0" algn="l">
               <a:spcBef>
@@ -10993,7 +11637,7 @@
                 <a:cs typeface="Ubuntu"/>
                 <a:sym typeface="Ubuntu"/>
               </a:rPr>
-              <a:t>_ </a:t>
+              <a:t>_ Google Cloud - Anthos</a:t>
             </a:r>
             <a:br>
               <a:rPr lang="pt-BR" sz="1400">
@@ -11016,7 +11660,7 @@
                 <a:cs typeface="Ubuntu Light"/>
                 <a:sym typeface="Ubuntu Light"/>
               </a:rPr>
-              <a:t>_ </a:t>
+              <a:t>_ https://cloud.google.com/anthos</a:t>
             </a:r>
             <a:endParaRPr sz="1400">
               <a:solidFill>
@@ -11049,7 +11693,7 @@
                 <a:cs typeface="Ubuntu"/>
                 <a:sym typeface="Ubuntu"/>
               </a:rPr>
-              <a:t>_ </a:t>
+              <a:t>_ Google Cloud - Anthos at the Edge</a:t>
             </a:r>
             <a:br>
               <a:rPr lang="pt-BR" sz="1400">
@@ -11072,7 +11716,7 @@
                 <a:cs typeface="Ubuntu Light"/>
                 <a:sym typeface="Ubuntu Light"/>
               </a:rPr>
-              <a:t>_ </a:t>
+              <a:t>_ https://cloud.google.com/solutions/anthos-edge</a:t>
             </a:r>
             <a:endParaRPr sz="1400">
               <a:solidFill>
@@ -11105,7 +11749,7 @@
                 <a:cs typeface="Ubuntu"/>
                 <a:sym typeface="Ubuntu"/>
               </a:rPr>
-              <a:t>_ </a:t>
+              <a:t>_ Azure Edge Zones</a:t>
             </a:r>
             <a:br>
               <a:rPr lang="pt-BR" sz="1400">
@@ -11128,7 +11772,7 @@
                 <a:cs typeface="Ubuntu Light"/>
                 <a:sym typeface="Ubuntu Light"/>
               </a:rPr>
-              <a:t>_ </a:t>
+              <a:t>_ https://azure.microsoft.com/pt-br/solutions/low-latency-edge-computing/#overview</a:t>
             </a:r>
             <a:endParaRPr sz="1400">
               <a:solidFill>
@@ -11161,7 +11805,7 @@
                 <a:cs typeface="Ubuntu"/>
                 <a:sym typeface="Ubuntu"/>
               </a:rPr>
-              <a:t>_ </a:t>
+              <a:t>_ Azure Stack Edge</a:t>
             </a:r>
             <a:br>
               <a:rPr lang="pt-BR" sz="1400">
@@ -11184,7 +11828,7 @@
                 <a:cs typeface="Ubuntu Light"/>
                 <a:sym typeface="Ubuntu Light"/>
               </a:rPr>
-              <a:t>_ </a:t>
+              <a:t>_ https://azure.microsoft.com/pt-br/products/azure-stack/edge/</a:t>
             </a:r>
             <a:endParaRPr sz="1400">
               <a:solidFill>
@@ -11217,7 +11861,7 @@
                 <a:cs typeface="Ubuntu"/>
                 <a:sym typeface="Ubuntu"/>
               </a:rPr>
-              <a:t>_ </a:t>
+              <a:t>_ Announcing Lucet: Fastly’s native WebAssembly compiler and runtime</a:t>
             </a:r>
             <a:br>
               <a:rPr lang="pt-BR" sz="1400">
@@ -11240,63 +11884,7 @@
                 <a:cs typeface="Ubuntu Light"/>
                 <a:sym typeface="Ubuntu Light"/>
               </a:rPr>
-              <a:t>_ </a:t>
-            </a:r>
-            <a:endParaRPr sz="1400">
-              <a:solidFill>
-                <a:schemeClr val="accent5"/>
-              </a:solidFill>
-              <a:latin typeface="Ubuntu Light"/>
-              <a:ea typeface="Ubuntu Light"/>
-              <a:cs typeface="Ubuntu Light"/>
-              <a:sym typeface="Ubuntu Light"/>
-            </a:endParaRPr>
-          </a:p>
-          <a:p>
-            <a:pPr indent="0" lvl="0" marL="0" rtl="0" algn="l">
-              <a:spcBef>
-                <a:spcPts val="0"/>
-              </a:spcBef>
-              <a:spcAft>
-                <a:spcPts val="0"/>
-              </a:spcAft>
-              <a:buSzPts val="990"/>
-              <a:buNone/>
-            </a:pPr>
-            <a:r>
-              <a:rPr lang="pt-BR" sz="1400">
-                <a:solidFill>
-                  <a:srgbClr val="EFEFEF"/>
-                </a:solidFill>
-                <a:latin typeface="Ubuntu"/>
-                <a:ea typeface="Ubuntu"/>
-                <a:cs typeface="Ubuntu"/>
-                <a:sym typeface="Ubuntu"/>
-              </a:rPr>
-              <a:t>_ </a:t>
-            </a:r>
-            <a:br>
-              <a:rPr lang="pt-BR" sz="1400">
-                <a:solidFill>
-                  <a:srgbClr val="EFEFEF"/>
-                </a:solidFill>
-                <a:latin typeface="Ubuntu"/>
-                <a:ea typeface="Ubuntu"/>
-                <a:cs typeface="Ubuntu"/>
-                <a:sym typeface="Ubuntu"/>
-              </a:rPr>
-            </a:br>
-            <a:r>
-              <a:rPr lang="pt-BR" sz="1400">
-                <a:solidFill>
-                  <a:schemeClr val="accent5"/>
-                </a:solidFill>
-                <a:latin typeface="Ubuntu Light"/>
-                <a:ea typeface="Ubuntu Light"/>
-                <a:cs typeface="Ubuntu Light"/>
-                <a:sym typeface="Ubuntu Light"/>
-              </a:rPr>
-              <a:t>_ </a:t>
+              <a:t>_ https://www.fastly.com/blog/announcing-lucet-fastly-native-webassembly-compiler-runtime</a:t>
             </a:r>
             <a:endParaRPr sz="1400">
               <a:solidFill>

</xml_diff>